<commit_message>
Travail maison 25-08 nuit
</commit_message>
<xml_diff>
--- a/PPL_presentation.pptx
+++ b/PPL_presentation.pptx
@@ -115,7 +115,7 @@
   </p:defaultTextStyle>
   <p:extLst>
     <p:ext uri="{EFAFB233-063F-42B5-8137-9DF3F51BA10A}">
-      <p15:sldGuideLst xmlns:p15="http://schemas.microsoft.com/office/powerpoint/2012/main">
+      <p15:sldGuideLst xmlns:p15="http://schemas.microsoft.com/office/powerpoint/2012/main" xmlns="">
         <p15:guide id="1" orient="horz" pos="1620" userDrawn="1">
           <p15:clr>
             <a:srgbClr val="A4A3A4"/>
@@ -129,7 +129,7 @@
       </p15:sldGuideLst>
     </p:ext>
     <p:ext uri="{2D200454-40CA-4A62-9FC3-DE9A4176ACB9}">
-      <p15:notesGuideLst xmlns:p15="http://schemas.microsoft.com/office/powerpoint/2012/main"/>
+      <p15:notesGuideLst xmlns:p15="http://schemas.microsoft.com/office/powerpoint/2012/main" xmlns=""/>
     </p:ext>
   </p:extLst>
 </p:presentation>
@@ -221,7 +221,7 @@
               <a:rPr lang="fr-CH" smtClean="0">
                 <a:latin typeface="Arial" panose="020B0604020202020204" pitchFamily="34" charset="0"/>
               </a:rPr>
-              <a:t>17.08.2025</a:t>
+              <a:t>25.08.2025</a:t>
             </a:fld>
             <a:endParaRPr lang="fr-CH" dirty="0">
               <a:latin typeface="Arial" panose="020B0604020202020204" pitchFamily="34" charset="0"/>
@@ -293,7 +293,7 @@
               <a:rPr lang="fr-CH" smtClean="0">
                 <a:latin typeface="Arial" panose="020B0604020202020204" pitchFamily="34" charset="0"/>
               </a:rPr>
-              <a:t>‹#›</a:t>
+              <a:t>‹N°›</a:t>
             </a:fld>
             <a:endParaRPr lang="fr-CH" dirty="0">
               <a:latin typeface="Arial" panose="020B0604020202020204" pitchFamily="34" charset="0"/>
@@ -399,7 +399,7 @@
             <a:fld id="{F8103E42-5239-1A40-AD33-3EE7E9DDF5FD}" type="datetimeFigureOut">
               <a:rPr lang="fr-FR" smtClean="0"/>
               <a:pPr/>
-              <a:t>17/08/2025</a:t>
+              <a:t>25/08/2025</a:t>
             </a:fld>
             <a:endParaRPr lang="fr-FR" dirty="0"/>
           </a:p>
@@ -537,7 +537,7 @@
             <a:fld id="{4CF50783-AAED-1941-8BCC-9F6140F0A6B1}" type="slidenum">
               <a:rPr lang="fr-FR" smtClean="0"/>
               <a:pPr/>
-              <a:t>‹#›</a:t>
+              <a:t>‹N°›</a:t>
             </a:fld>
             <a:endParaRPr lang="fr-FR" dirty="0"/>
           </a:p>
@@ -690,7 +690,7 @@
           <a:bodyPr/>
           <a:lstStyle/>
           <a:p>
-            <a:endParaRPr lang="LID4096" dirty="0"/>
+            <a:endParaRPr lang="x-none" dirty="0"/>
           </a:p>
         </p:txBody>
       </p:sp>
@@ -739,7 +739,7 @@
         <p:cNvPr id="1" name="">
           <a:extLst>
             <a:ext uri="{FF2B5EF4-FFF2-40B4-BE49-F238E27FC236}">
-              <a16:creationId xmlns:a16="http://schemas.microsoft.com/office/drawing/2014/main" id="{FA85BA80-36D3-6675-64A3-72B2C57396F6}"/>
+              <a16:creationId xmlns:a16="http://schemas.microsoft.com/office/drawing/2014/main" xmlns="" id="{FA85BA80-36D3-6675-64A3-72B2C57396F6}"/>
             </a:ext>
           </a:extLst>
         </p:cNvPr>
@@ -759,7 +759,7 @@
           <p:cNvPr id="2" name="Slide Image Placeholder 1">
             <a:extLst>
               <a:ext uri="{FF2B5EF4-FFF2-40B4-BE49-F238E27FC236}">
-                <a16:creationId xmlns:a16="http://schemas.microsoft.com/office/drawing/2014/main" id="{FD1FE812-9B90-3FA8-1147-7A09091E7B69}"/>
+                <a16:creationId xmlns:a16="http://schemas.microsoft.com/office/drawing/2014/main" xmlns="" id="{FD1FE812-9B90-3FA8-1147-7A09091E7B69}"/>
               </a:ext>
             </a:extLst>
           </p:cNvPr>
@@ -777,7 +777,7 @@
           <p:cNvPr id="3" name="Notes Placeholder 2">
             <a:extLst>
               <a:ext uri="{FF2B5EF4-FFF2-40B4-BE49-F238E27FC236}">
-                <a16:creationId xmlns:a16="http://schemas.microsoft.com/office/drawing/2014/main" id="{A610CD65-7BD2-C3EE-9FB5-71E2D492ADED}"/>
+                <a16:creationId xmlns:a16="http://schemas.microsoft.com/office/drawing/2014/main" xmlns="" id="{A610CD65-7BD2-C3EE-9FB5-71E2D492ADED}"/>
               </a:ext>
             </a:extLst>
           </p:cNvPr>
@@ -793,7 +793,7 @@
           <a:bodyPr/>
           <a:lstStyle/>
           <a:p>
-            <a:endParaRPr lang="LID4096" dirty="0"/>
+            <a:endParaRPr lang="x-none" dirty="0"/>
           </a:p>
         </p:txBody>
       </p:sp>
@@ -802,7 +802,7 @@
           <p:cNvPr id="4" name="Slide Number Placeholder 3">
             <a:extLst>
               <a:ext uri="{FF2B5EF4-FFF2-40B4-BE49-F238E27FC236}">
-                <a16:creationId xmlns:a16="http://schemas.microsoft.com/office/drawing/2014/main" id="{5594FFBA-ADFB-8FA6-DA43-FA90DAB98C93}"/>
+                <a16:creationId xmlns:a16="http://schemas.microsoft.com/office/drawing/2014/main" xmlns="" id="{5594FFBA-ADFB-8FA6-DA43-FA90DAB98C93}"/>
               </a:ext>
             </a:extLst>
           </p:cNvPr>
@@ -862,7 +862,7 @@
           <p:cNvPr id="12" name="Espace réservé pour une image  11">
             <a:extLst>
               <a:ext uri="{FF2B5EF4-FFF2-40B4-BE49-F238E27FC236}">
-                <a16:creationId xmlns:a16="http://schemas.microsoft.com/office/drawing/2014/main" id="{4CF6F629-51E7-9F40-939D-F50AE3925ADE}"/>
+                <a16:creationId xmlns:a16="http://schemas.microsoft.com/office/drawing/2014/main" xmlns="" id="{4CF6F629-51E7-9F40-939D-F50AE3925ADE}"/>
               </a:ext>
             </a:extLst>
           </p:cNvPr>
@@ -1010,7 +1010,7 @@
           <p:cNvPr id="9" name="Image 8">
             <a:extLst>
               <a:ext uri="{FF2B5EF4-FFF2-40B4-BE49-F238E27FC236}">
-                <a16:creationId xmlns:a16="http://schemas.microsoft.com/office/drawing/2014/main" id="{6535A482-EC85-1C41-A1E4-7882A0E39FFD}"/>
+                <a16:creationId xmlns:a16="http://schemas.microsoft.com/office/drawing/2014/main" xmlns="" id="{6535A482-EC85-1C41-A1E4-7882A0E39FFD}"/>
               </a:ext>
             </a:extLst>
           </p:cNvPr>
@@ -1040,7 +1040,7 @@
           <p:cNvPr id="16" name="Espace réservé du texte 4">
             <a:extLst>
               <a:ext uri="{FF2B5EF4-FFF2-40B4-BE49-F238E27FC236}">
-                <a16:creationId xmlns:a16="http://schemas.microsoft.com/office/drawing/2014/main" id="{01960462-6F28-0740-916D-499D3BEDB2BE}"/>
+                <a16:creationId xmlns:a16="http://schemas.microsoft.com/office/drawing/2014/main" xmlns="" id="{01960462-6F28-0740-916D-499D3BEDB2BE}"/>
               </a:ext>
             </a:extLst>
           </p:cNvPr>
@@ -1088,7 +1088,7 @@
           <p:cNvPr id="5" name="Espace réservé du texte 4">
             <a:extLst>
               <a:ext uri="{FF2B5EF4-FFF2-40B4-BE49-F238E27FC236}">
-                <a16:creationId xmlns:a16="http://schemas.microsoft.com/office/drawing/2014/main" id="{1E187583-F16A-6F41-8B68-000F9C9C20D3}"/>
+                <a16:creationId xmlns:a16="http://schemas.microsoft.com/office/drawing/2014/main" xmlns="" id="{1E187583-F16A-6F41-8B68-000F9C9C20D3}"/>
               </a:ext>
             </a:extLst>
           </p:cNvPr>
@@ -1143,7 +1143,7 @@
   </p:clrMapOvr>
   <p:extLst>
     <p:ext uri="{DCECCB84-F9BA-43D5-87BE-67443E8EF086}">
-      <p15:sldGuideLst xmlns:p15="http://schemas.microsoft.com/office/powerpoint/2012/main">
+      <p15:sldGuideLst xmlns:p15="http://schemas.microsoft.com/office/powerpoint/2012/main" xmlns="">
         <p15:guide id="1" orient="horz" pos="1620" userDrawn="1">
           <p15:clr>
             <a:srgbClr val="FBAE40"/>
@@ -1266,7 +1266,7 @@
           <p:cNvPr id="8" name="Titre 7">
             <a:extLst>
               <a:ext uri="{FF2B5EF4-FFF2-40B4-BE49-F238E27FC236}">
-                <a16:creationId xmlns:a16="http://schemas.microsoft.com/office/drawing/2014/main" id="{6897D737-724C-984A-82E1-2A2DBD5F6249}"/>
+                <a16:creationId xmlns:a16="http://schemas.microsoft.com/office/drawing/2014/main" xmlns="" id="{6897D737-724C-984A-82E1-2A2DBD5F6249}"/>
               </a:ext>
             </a:extLst>
           </p:cNvPr>
@@ -1294,7 +1294,7 @@
           <p:cNvPr id="9" name="Espace réservé de la date 8">
             <a:extLst>
               <a:ext uri="{FF2B5EF4-FFF2-40B4-BE49-F238E27FC236}">
-                <a16:creationId xmlns:a16="http://schemas.microsoft.com/office/drawing/2014/main" id="{E34C2B73-67B7-BB4C-AE0F-7D16D8DDD2B2}"/>
+                <a16:creationId xmlns:a16="http://schemas.microsoft.com/office/drawing/2014/main" xmlns="" id="{E34C2B73-67B7-BB4C-AE0F-7D16D8DDD2B2}"/>
               </a:ext>
             </a:extLst>
           </p:cNvPr>
@@ -1323,7 +1323,7 @@
           <p:cNvPr id="10" name="Espace réservé du pied de page 9">
             <a:extLst>
               <a:ext uri="{FF2B5EF4-FFF2-40B4-BE49-F238E27FC236}">
-                <a16:creationId xmlns:a16="http://schemas.microsoft.com/office/drawing/2014/main" id="{C9FF6AA9-AC16-D748-B815-56221BFFFB93}"/>
+                <a16:creationId xmlns:a16="http://schemas.microsoft.com/office/drawing/2014/main" xmlns="" id="{C9FF6AA9-AC16-D748-B815-56221BFFFB93}"/>
               </a:ext>
             </a:extLst>
           </p:cNvPr>
@@ -1352,7 +1352,7 @@
           <p:cNvPr id="11" name="Espace réservé du numéro de diapositive 10">
             <a:extLst>
               <a:ext uri="{FF2B5EF4-FFF2-40B4-BE49-F238E27FC236}">
-                <a16:creationId xmlns:a16="http://schemas.microsoft.com/office/drawing/2014/main" id="{DD59D891-3F23-D04C-AB43-6FA4220AFE80}"/>
+                <a16:creationId xmlns:a16="http://schemas.microsoft.com/office/drawing/2014/main" xmlns="" id="{DD59D891-3F23-D04C-AB43-6FA4220AFE80}"/>
               </a:ext>
             </a:extLst>
           </p:cNvPr>
@@ -1371,7 +1371,7 @@
             <a:fld id="{E1E1CD7C-2161-7D43-862E-CE4C333CD873}" type="slidenum">
               <a:rPr lang="fr-FR" smtClean="0"/>
               <a:pPr/>
-              <a:t>‹#›</a:t>
+              <a:t>‹N°›</a:t>
             </a:fld>
             <a:endParaRPr lang="fr-FR" dirty="0"/>
           </a:p>
@@ -1412,7 +1412,7 @@
           <p:cNvPr id="6" name="Titre 5">
             <a:extLst>
               <a:ext uri="{FF2B5EF4-FFF2-40B4-BE49-F238E27FC236}">
-                <a16:creationId xmlns:a16="http://schemas.microsoft.com/office/drawing/2014/main" id="{9BFFD8D9-6AAA-B44F-8BD5-98D7A6546A6C}"/>
+                <a16:creationId xmlns:a16="http://schemas.microsoft.com/office/drawing/2014/main" xmlns="" id="{9BFFD8D9-6AAA-B44F-8BD5-98D7A6546A6C}"/>
               </a:ext>
             </a:extLst>
           </p:cNvPr>
@@ -1440,7 +1440,7 @@
           <p:cNvPr id="7" name="Espace réservé de la date 6">
             <a:extLst>
               <a:ext uri="{FF2B5EF4-FFF2-40B4-BE49-F238E27FC236}">
-                <a16:creationId xmlns:a16="http://schemas.microsoft.com/office/drawing/2014/main" id="{084C64CE-C88F-2044-AD84-19F588F18902}"/>
+                <a16:creationId xmlns:a16="http://schemas.microsoft.com/office/drawing/2014/main" xmlns="" id="{084C64CE-C88F-2044-AD84-19F588F18902}"/>
               </a:ext>
             </a:extLst>
           </p:cNvPr>
@@ -1469,7 +1469,7 @@
           <p:cNvPr id="8" name="Espace réservé du pied de page 7">
             <a:extLst>
               <a:ext uri="{FF2B5EF4-FFF2-40B4-BE49-F238E27FC236}">
-                <a16:creationId xmlns:a16="http://schemas.microsoft.com/office/drawing/2014/main" id="{A948AF20-C2DF-3542-BB6A-8354A9817325}"/>
+                <a16:creationId xmlns:a16="http://schemas.microsoft.com/office/drawing/2014/main" xmlns="" id="{A948AF20-C2DF-3542-BB6A-8354A9817325}"/>
               </a:ext>
             </a:extLst>
           </p:cNvPr>
@@ -1498,7 +1498,7 @@
           <p:cNvPr id="9" name="Espace réservé du numéro de diapositive 8">
             <a:extLst>
               <a:ext uri="{FF2B5EF4-FFF2-40B4-BE49-F238E27FC236}">
-                <a16:creationId xmlns:a16="http://schemas.microsoft.com/office/drawing/2014/main" id="{71083942-1443-BC45-9F95-32C82A8DCDEF}"/>
+                <a16:creationId xmlns:a16="http://schemas.microsoft.com/office/drawing/2014/main" xmlns="" id="{71083942-1443-BC45-9F95-32C82A8DCDEF}"/>
               </a:ext>
             </a:extLst>
           </p:cNvPr>
@@ -1517,7 +1517,7 @@
             <a:fld id="{E1E1CD7C-2161-7D43-862E-CE4C333CD873}" type="slidenum">
               <a:rPr lang="fr-FR" smtClean="0"/>
               <a:pPr/>
-              <a:t>‹#›</a:t>
+              <a:t>‹N°›</a:t>
             </a:fld>
             <a:endParaRPr lang="fr-FR" dirty="0"/>
           </a:p>
@@ -1558,7 +1558,7 @@
           <p:cNvPr id="7" name="Espace réservé pour une image  6">
             <a:extLst>
               <a:ext uri="{FF2B5EF4-FFF2-40B4-BE49-F238E27FC236}">
-                <a16:creationId xmlns:a16="http://schemas.microsoft.com/office/drawing/2014/main" id="{625DAC6D-23F0-6941-BE81-E7A79CA3AFFD}"/>
+                <a16:creationId xmlns:a16="http://schemas.microsoft.com/office/drawing/2014/main" xmlns="" id="{625DAC6D-23F0-6941-BE81-E7A79CA3AFFD}"/>
               </a:ext>
             </a:extLst>
           </p:cNvPr>
@@ -1630,7 +1630,7 @@
           <p:cNvPr id="3" name="Espace réservé de la date 2">
             <a:extLst>
               <a:ext uri="{FF2B5EF4-FFF2-40B4-BE49-F238E27FC236}">
-                <a16:creationId xmlns:a16="http://schemas.microsoft.com/office/drawing/2014/main" id="{60E5EA1C-63CE-2C4F-B9F4-39FDBC14B9A3}"/>
+                <a16:creationId xmlns:a16="http://schemas.microsoft.com/office/drawing/2014/main" xmlns="" id="{60E5EA1C-63CE-2C4F-B9F4-39FDBC14B9A3}"/>
               </a:ext>
             </a:extLst>
           </p:cNvPr>
@@ -1659,7 +1659,7 @@
           <p:cNvPr id="4" name="Espace réservé du pied de page 3">
             <a:extLst>
               <a:ext uri="{FF2B5EF4-FFF2-40B4-BE49-F238E27FC236}">
-                <a16:creationId xmlns:a16="http://schemas.microsoft.com/office/drawing/2014/main" id="{8E7A5892-F23D-BD48-84D1-FD279BA16865}"/>
+                <a16:creationId xmlns:a16="http://schemas.microsoft.com/office/drawing/2014/main" xmlns="" id="{8E7A5892-F23D-BD48-84D1-FD279BA16865}"/>
               </a:ext>
             </a:extLst>
           </p:cNvPr>
@@ -1688,7 +1688,7 @@
           <p:cNvPr id="5" name="Espace réservé du numéro de diapositive 4">
             <a:extLst>
               <a:ext uri="{FF2B5EF4-FFF2-40B4-BE49-F238E27FC236}">
-                <a16:creationId xmlns:a16="http://schemas.microsoft.com/office/drawing/2014/main" id="{6C516D46-C7BB-2141-A4EE-18D1756414F6}"/>
+                <a16:creationId xmlns:a16="http://schemas.microsoft.com/office/drawing/2014/main" xmlns="" id="{6C516D46-C7BB-2141-A4EE-18D1756414F6}"/>
               </a:ext>
             </a:extLst>
           </p:cNvPr>
@@ -1707,7 +1707,7 @@
             <a:fld id="{E1E1CD7C-2161-7D43-862E-CE4C333CD873}" type="slidenum">
               <a:rPr lang="fr-FR" smtClean="0"/>
               <a:pPr/>
-              <a:t>‹#›</a:t>
+              <a:t>‹N°›</a:t>
             </a:fld>
             <a:endParaRPr lang="fr-FR" dirty="0"/>
           </a:p>
@@ -1748,7 +1748,7 @@
           <p:cNvPr id="7" name="Espace réservé pour une image  6">
             <a:extLst>
               <a:ext uri="{FF2B5EF4-FFF2-40B4-BE49-F238E27FC236}">
-                <a16:creationId xmlns:a16="http://schemas.microsoft.com/office/drawing/2014/main" id="{625DAC6D-23F0-6941-BE81-E7A79CA3AFFD}"/>
+                <a16:creationId xmlns:a16="http://schemas.microsoft.com/office/drawing/2014/main" xmlns="" id="{625DAC6D-23F0-6941-BE81-E7A79CA3AFFD}"/>
               </a:ext>
             </a:extLst>
           </p:cNvPr>
@@ -1781,7 +1781,7 @@
           <p:cNvPr id="5" name="Espace réservé de la date 4">
             <a:extLst>
               <a:ext uri="{FF2B5EF4-FFF2-40B4-BE49-F238E27FC236}">
-                <a16:creationId xmlns:a16="http://schemas.microsoft.com/office/drawing/2014/main" id="{91E6F4EB-CC02-6E4D-9146-CE4A7A789A95}"/>
+                <a16:creationId xmlns:a16="http://schemas.microsoft.com/office/drawing/2014/main" xmlns="" id="{91E6F4EB-CC02-6E4D-9146-CE4A7A789A95}"/>
               </a:ext>
             </a:extLst>
           </p:cNvPr>
@@ -1810,7 +1810,7 @@
           <p:cNvPr id="6" name="Espace réservé du pied de page 5">
             <a:extLst>
               <a:ext uri="{FF2B5EF4-FFF2-40B4-BE49-F238E27FC236}">
-                <a16:creationId xmlns:a16="http://schemas.microsoft.com/office/drawing/2014/main" id="{DED4AA2C-29B3-CA42-B7C3-C932911A7586}"/>
+                <a16:creationId xmlns:a16="http://schemas.microsoft.com/office/drawing/2014/main" xmlns="" id="{DED4AA2C-29B3-CA42-B7C3-C932911A7586}"/>
               </a:ext>
             </a:extLst>
           </p:cNvPr>
@@ -1839,7 +1839,7 @@
           <p:cNvPr id="8" name="Espace réservé du numéro de diapositive 7">
             <a:extLst>
               <a:ext uri="{FF2B5EF4-FFF2-40B4-BE49-F238E27FC236}">
-                <a16:creationId xmlns:a16="http://schemas.microsoft.com/office/drawing/2014/main" id="{0FE7A1E3-AAEC-7641-B6C5-8D9FC0B6A211}"/>
+                <a16:creationId xmlns:a16="http://schemas.microsoft.com/office/drawing/2014/main" xmlns="" id="{0FE7A1E3-AAEC-7641-B6C5-8D9FC0B6A211}"/>
               </a:ext>
             </a:extLst>
           </p:cNvPr>
@@ -1858,7 +1858,7 @@
             <a:fld id="{E1E1CD7C-2161-7D43-862E-CE4C333CD873}" type="slidenum">
               <a:rPr lang="fr-FR" smtClean="0"/>
               <a:pPr/>
-              <a:t>‹#›</a:t>
+              <a:t>‹N°›</a:t>
             </a:fld>
             <a:endParaRPr lang="fr-FR" dirty="0"/>
           </a:p>
@@ -1899,7 +1899,7 @@
           <p:cNvPr id="7" name="Espace réservé pour une image  6">
             <a:extLst>
               <a:ext uri="{FF2B5EF4-FFF2-40B4-BE49-F238E27FC236}">
-                <a16:creationId xmlns:a16="http://schemas.microsoft.com/office/drawing/2014/main" id="{625DAC6D-23F0-6941-BE81-E7A79CA3AFFD}"/>
+                <a16:creationId xmlns:a16="http://schemas.microsoft.com/office/drawing/2014/main" xmlns="" id="{625DAC6D-23F0-6941-BE81-E7A79CA3AFFD}"/>
               </a:ext>
             </a:extLst>
           </p:cNvPr>
@@ -1976,7 +1976,7 @@
           <p:cNvPr id="6" name="Espace réservé de la date 5">
             <a:extLst>
               <a:ext uri="{FF2B5EF4-FFF2-40B4-BE49-F238E27FC236}">
-                <a16:creationId xmlns:a16="http://schemas.microsoft.com/office/drawing/2014/main" id="{37CF3032-2465-874C-B786-95E1B594A5AB}"/>
+                <a16:creationId xmlns:a16="http://schemas.microsoft.com/office/drawing/2014/main" xmlns="" id="{37CF3032-2465-874C-B786-95E1B594A5AB}"/>
               </a:ext>
             </a:extLst>
           </p:cNvPr>
@@ -2005,7 +2005,7 @@
           <p:cNvPr id="8" name="Espace réservé du pied de page 7">
             <a:extLst>
               <a:ext uri="{FF2B5EF4-FFF2-40B4-BE49-F238E27FC236}">
-                <a16:creationId xmlns:a16="http://schemas.microsoft.com/office/drawing/2014/main" id="{AAF73E2A-22D7-894A-9267-185CB4E4B13E}"/>
+                <a16:creationId xmlns:a16="http://schemas.microsoft.com/office/drawing/2014/main" xmlns="" id="{AAF73E2A-22D7-894A-9267-185CB4E4B13E}"/>
               </a:ext>
             </a:extLst>
           </p:cNvPr>
@@ -2034,7 +2034,7 @@
           <p:cNvPr id="9" name="Espace réservé du numéro de diapositive 8">
             <a:extLst>
               <a:ext uri="{FF2B5EF4-FFF2-40B4-BE49-F238E27FC236}">
-                <a16:creationId xmlns:a16="http://schemas.microsoft.com/office/drawing/2014/main" id="{39D9777C-EC90-1141-9E30-4B4F669C2BE1}"/>
+                <a16:creationId xmlns:a16="http://schemas.microsoft.com/office/drawing/2014/main" xmlns="" id="{39D9777C-EC90-1141-9E30-4B4F669C2BE1}"/>
               </a:ext>
             </a:extLst>
           </p:cNvPr>
@@ -2053,7 +2053,7 @@
             <a:fld id="{E1E1CD7C-2161-7D43-862E-CE4C333CD873}" type="slidenum">
               <a:rPr lang="fr-FR" smtClean="0"/>
               <a:pPr/>
-              <a:t>‹#›</a:t>
+              <a:t>‹N°›</a:t>
             </a:fld>
             <a:endParaRPr lang="fr-FR" dirty="0"/>
           </a:p>
@@ -2064,7 +2064,7 @@
           <p:cNvPr id="11" name="Titre 10">
             <a:extLst>
               <a:ext uri="{FF2B5EF4-FFF2-40B4-BE49-F238E27FC236}">
-                <a16:creationId xmlns:a16="http://schemas.microsoft.com/office/drawing/2014/main" id="{0E011164-727C-4C46-B34E-7729CB350E3E}"/>
+                <a16:creationId xmlns:a16="http://schemas.microsoft.com/office/drawing/2014/main" xmlns="" id="{0E011164-727C-4C46-B34E-7729CB350E3E}"/>
               </a:ext>
             </a:extLst>
           </p:cNvPr>
@@ -2122,7 +2122,7 @@
           <p:cNvPr id="5" name="Espace réservé de la date 4">
             <a:extLst>
               <a:ext uri="{FF2B5EF4-FFF2-40B4-BE49-F238E27FC236}">
-                <a16:creationId xmlns:a16="http://schemas.microsoft.com/office/drawing/2014/main" id="{4D8101AB-8ACE-BB4C-9D61-B4AABFE11591}"/>
+                <a16:creationId xmlns:a16="http://schemas.microsoft.com/office/drawing/2014/main" xmlns="" id="{4D8101AB-8ACE-BB4C-9D61-B4AABFE11591}"/>
               </a:ext>
             </a:extLst>
           </p:cNvPr>
@@ -2151,7 +2151,7 @@
           <p:cNvPr id="6" name="Espace réservé du pied de page 5">
             <a:extLst>
               <a:ext uri="{FF2B5EF4-FFF2-40B4-BE49-F238E27FC236}">
-                <a16:creationId xmlns:a16="http://schemas.microsoft.com/office/drawing/2014/main" id="{5F9CFC1D-0B2A-0A4E-9C0D-682EECA55703}"/>
+                <a16:creationId xmlns:a16="http://schemas.microsoft.com/office/drawing/2014/main" xmlns="" id="{5F9CFC1D-0B2A-0A4E-9C0D-682EECA55703}"/>
               </a:ext>
             </a:extLst>
           </p:cNvPr>
@@ -2180,7 +2180,7 @@
           <p:cNvPr id="7" name="Espace réservé du numéro de diapositive 6">
             <a:extLst>
               <a:ext uri="{FF2B5EF4-FFF2-40B4-BE49-F238E27FC236}">
-                <a16:creationId xmlns:a16="http://schemas.microsoft.com/office/drawing/2014/main" id="{56622065-A833-2340-B0FD-ACB065A3B8CF}"/>
+                <a16:creationId xmlns:a16="http://schemas.microsoft.com/office/drawing/2014/main" xmlns="" id="{56622065-A833-2340-B0FD-ACB065A3B8CF}"/>
               </a:ext>
             </a:extLst>
           </p:cNvPr>
@@ -2199,7 +2199,7 @@
             <a:fld id="{E1E1CD7C-2161-7D43-862E-CE4C333CD873}" type="slidenum">
               <a:rPr lang="fr-FR" smtClean="0"/>
               <a:pPr/>
-              <a:t>‹#›</a:t>
+              <a:t>‹N°›</a:t>
             </a:fld>
             <a:endParaRPr lang="fr-FR" dirty="0"/>
           </a:p>
@@ -2240,7 +2240,7 @@
           <p:cNvPr id="7" name="Rectangle 6">
             <a:extLst>
               <a:ext uri="{FF2B5EF4-FFF2-40B4-BE49-F238E27FC236}">
-                <a16:creationId xmlns:a16="http://schemas.microsoft.com/office/drawing/2014/main" id="{4A9F6C81-AE59-DE44-BF60-E773080CD91C}"/>
+                <a16:creationId xmlns:a16="http://schemas.microsoft.com/office/drawing/2014/main" xmlns="" id="{4A9F6C81-AE59-DE44-BF60-E773080CD91C}"/>
               </a:ext>
             </a:extLst>
           </p:cNvPr>
@@ -2453,7 +2453,7 @@
           <p:cNvPr id="9" name="Espace réservé pour une image  8">
             <a:extLst>
               <a:ext uri="{FF2B5EF4-FFF2-40B4-BE49-F238E27FC236}">
-                <a16:creationId xmlns:a16="http://schemas.microsoft.com/office/drawing/2014/main" id="{C58F136D-3292-C745-91DE-A21191C16FE7}"/>
+                <a16:creationId xmlns:a16="http://schemas.microsoft.com/office/drawing/2014/main" xmlns="" id="{C58F136D-3292-C745-91DE-A21191C16FE7}"/>
               </a:ext>
             </a:extLst>
           </p:cNvPr>
@@ -2561,7 +2561,7 @@
             <a:fld id="{E1E1CD7C-2161-7D43-862E-CE4C333CD873}" type="slidenum">
               <a:rPr lang="fr-FR" smtClean="0"/>
               <a:pPr/>
-              <a:t>‹#›</a:t>
+              <a:t>‹N°›</a:t>
             </a:fld>
             <a:endParaRPr lang="fr-FR" dirty="0"/>
           </a:p>
@@ -2602,7 +2602,7 @@
           <p:cNvPr id="7" name="Rectangle 6">
             <a:extLst>
               <a:ext uri="{FF2B5EF4-FFF2-40B4-BE49-F238E27FC236}">
-                <a16:creationId xmlns:a16="http://schemas.microsoft.com/office/drawing/2014/main" id="{4A9F6C81-AE59-DE44-BF60-E773080CD91C}"/>
+                <a16:creationId xmlns:a16="http://schemas.microsoft.com/office/drawing/2014/main" xmlns="" id="{4A9F6C81-AE59-DE44-BF60-E773080CD91C}"/>
               </a:ext>
             </a:extLst>
           </p:cNvPr>
@@ -2815,7 +2815,7 @@
           <p:cNvPr id="9" name="Espace réservé pour une image  8">
             <a:extLst>
               <a:ext uri="{FF2B5EF4-FFF2-40B4-BE49-F238E27FC236}">
-                <a16:creationId xmlns:a16="http://schemas.microsoft.com/office/drawing/2014/main" id="{C58F136D-3292-C745-91DE-A21191C16FE7}"/>
+                <a16:creationId xmlns:a16="http://schemas.microsoft.com/office/drawing/2014/main" xmlns="" id="{C58F136D-3292-C745-91DE-A21191C16FE7}"/>
               </a:ext>
             </a:extLst>
           </p:cNvPr>
@@ -2923,7 +2923,7 @@
             <a:fld id="{E1E1CD7C-2161-7D43-862E-CE4C333CD873}" type="slidenum">
               <a:rPr lang="fr-FR" smtClean="0"/>
               <a:pPr/>
-              <a:t>‹#›</a:t>
+              <a:t>‹N°›</a:t>
             </a:fld>
             <a:endParaRPr lang="fr-FR" dirty="0"/>
           </a:p>
@@ -2964,7 +2964,7 @@
           <p:cNvPr id="7" name="Rectangle 6">
             <a:extLst>
               <a:ext uri="{FF2B5EF4-FFF2-40B4-BE49-F238E27FC236}">
-                <a16:creationId xmlns:a16="http://schemas.microsoft.com/office/drawing/2014/main" id="{4A9F6C81-AE59-DE44-BF60-E773080CD91C}"/>
+                <a16:creationId xmlns:a16="http://schemas.microsoft.com/office/drawing/2014/main" xmlns="" id="{4A9F6C81-AE59-DE44-BF60-E773080CD91C}"/>
               </a:ext>
             </a:extLst>
           </p:cNvPr>
@@ -3177,7 +3177,7 @@
           <p:cNvPr id="9" name="Espace réservé pour une image  8">
             <a:extLst>
               <a:ext uri="{FF2B5EF4-FFF2-40B4-BE49-F238E27FC236}">
-                <a16:creationId xmlns:a16="http://schemas.microsoft.com/office/drawing/2014/main" id="{C58F136D-3292-C745-91DE-A21191C16FE7}"/>
+                <a16:creationId xmlns:a16="http://schemas.microsoft.com/office/drawing/2014/main" xmlns="" id="{C58F136D-3292-C745-91DE-A21191C16FE7}"/>
               </a:ext>
             </a:extLst>
           </p:cNvPr>
@@ -3285,7 +3285,7 @@
             <a:fld id="{E1E1CD7C-2161-7D43-862E-CE4C333CD873}" type="slidenum">
               <a:rPr lang="fr-FR" smtClean="0"/>
               <a:pPr/>
-              <a:t>‹#›</a:t>
+              <a:t>‹N°›</a:t>
             </a:fld>
             <a:endParaRPr lang="fr-FR" dirty="0"/>
           </a:p>
@@ -3353,7 +3353,7 @@
           <p:cNvPr id="8" name="Titre 7">
             <a:extLst>
               <a:ext uri="{FF2B5EF4-FFF2-40B4-BE49-F238E27FC236}">
-                <a16:creationId xmlns:a16="http://schemas.microsoft.com/office/drawing/2014/main" id="{A30C78BE-DAD0-D748-8B93-AD898D00C88C}"/>
+                <a16:creationId xmlns:a16="http://schemas.microsoft.com/office/drawing/2014/main" xmlns="" id="{A30C78BE-DAD0-D748-8B93-AD898D00C88C}"/>
               </a:ext>
             </a:extLst>
           </p:cNvPr>
@@ -3381,7 +3381,7 @@
           <p:cNvPr id="9" name="Espace réservé de la date 8">
             <a:extLst>
               <a:ext uri="{FF2B5EF4-FFF2-40B4-BE49-F238E27FC236}">
-                <a16:creationId xmlns:a16="http://schemas.microsoft.com/office/drawing/2014/main" id="{131A8490-33AC-9443-A9FC-9A5E9322967C}"/>
+                <a16:creationId xmlns:a16="http://schemas.microsoft.com/office/drawing/2014/main" xmlns="" id="{131A8490-33AC-9443-A9FC-9A5E9322967C}"/>
               </a:ext>
             </a:extLst>
           </p:cNvPr>
@@ -3410,7 +3410,7 @@
           <p:cNvPr id="10" name="Espace réservé du pied de page 9">
             <a:extLst>
               <a:ext uri="{FF2B5EF4-FFF2-40B4-BE49-F238E27FC236}">
-                <a16:creationId xmlns:a16="http://schemas.microsoft.com/office/drawing/2014/main" id="{B875139C-6471-774D-89EF-2B93FAD2CB2A}"/>
+                <a16:creationId xmlns:a16="http://schemas.microsoft.com/office/drawing/2014/main" xmlns="" id="{B875139C-6471-774D-89EF-2B93FAD2CB2A}"/>
               </a:ext>
             </a:extLst>
           </p:cNvPr>
@@ -3439,7 +3439,7 @@
           <p:cNvPr id="11" name="Espace réservé du numéro de diapositive 10">
             <a:extLst>
               <a:ext uri="{FF2B5EF4-FFF2-40B4-BE49-F238E27FC236}">
-                <a16:creationId xmlns:a16="http://schemas.microsoft.com/office/drawing/2014/main" id="{3942AF23-4BDC-8C4A-9212-AF88439C6122}"/>
+                <a16:creationId xmlns:a16="http://schemas.microsoft.com/office/drawing/2014/main" xmlns="" id="{3942AF23-4BDC-8C4A-9212-AF88439C6122}"/>
               </a:ext>
             </a:extLst>
           </p:cNvPr>
@@ -3458,7 +3458,7 @@
             <a:fld id="{E1E1CD7C-2161-7D43-862E-CE4C333CD873}" type="slidenum">
               <a:rPr lang="fr-FR" smtClean="0"/>
               <a:pPr/>
-              <a:t>‹#›</a:t>
+              <a:t>‹N°›</a:t>
             </a:fld>
             <a:endParaRPr lang="fr-FR" dirty="0"/>
           </a:p>
@@ -3531,7 +3531,7 @@
           <p:cNvPr id="8" name="Espace réservé pour une image  7">
             <a:extLst>
               <a:ext uri="{FF2B5EF4-FFF2-40B4-BE49-F238E27FC236}">
-                <a16:creationId xmlns:a16="http://schemas.microsoft.com/office/drawing/2014/main" id="{70ED9B2D-C513-AF40-B94F-355C174B8FF0}"/>
+                <a16:creationId xmlns:a16="http://schemas.microsoft.com/office/drawing/2014/main" xmlns="" id="{70ED9B2D-C513-AF40-B94F-355C174B8FF0}"/>
               </a:ext>
             </a:extLst>
           </p:cNvPr>
@@ -3564,7 +3564,7 @@
           <p:cNvPr id="5" name="Titre 4">
             <a:extLst>
               <a:ext uri="{FF2B5EF4-FFF2-40B4-BE49-F238E27FC236}">
-                <a16:creationId xmlns:a16="http://schemas.microsoft.com/office/drawing/2014/main" id="{55F20A3C-6DA6-684F-8F84-A7C8F1339C00}"/>
+                <a16:creationId xmlns:a16="http://schemas.microsoft.com/office/drawing/2014/main" xmlns="" id="{55F20A3C-6DA6-684F-8F84-A7C8F1339C00}"/>
               </a:ext>
             </a:extLst>
           </p:cNvPr>
@@ -3592,7 +3592,7 @@
           <p:cNvPr id="6" name="Espace réservé de la date 5">
             <a:extLst>
               <a:ext uri="{FF2B5EF4-FFF2-40B4-BE49-F238E27FC236}">
-                <a16:creationId xmlns:a16="http://schemas.microsoft.com/office/drawing/2014/main" id="{B633A2CC-2D27-AE47-AE09-87A5F61228B8}"/>
+                <a16:creationId xmlns:a16="http://schemas.microsoft.com/office/drawing/2014/main" xmlns="" id="{B633A2CC-2D27-AE47-AE09-87A5F61228B8}"/>
               </a:ext>
             </a:extLst>
           </p:cNvPr>
@@ -3621,7 +3621,7 @@
           <p:cNvPr id="11" name="Espace réservé du pied de page 10">
             <a:extLst>
               <a:ext uri="{FF2B5EF4-FFF2-40B4-BE49-F238E27FC236}">
-                <a16:creationId xmlns:a16="http://schemas.microsoft.com/office/drawing/2014/main" id="{CABC000E-4E22-1A40-9D3F-FE2F141E5CA4}"/>
+                <a16:creationId xmlns:a16="http://schemas.microsoft.com/office/drawing/2014/main" xmlns="" id="{CABC000E-4E22-1A40-9D3F-FE2F141E5CA4}"/>
               </a:ext>
             </a:extLst>
           </p:cNvPr>
@@ -3650,7 +3650,7 @@
           <p:cNvPr id="12" name="Espace réservé du numéro de diapositive 11">
             <a:extLst>
               <a:ext uri="{FF2B5EF4-FFF2-40B4-BE49-F238E27FC236}">
-                <a16:creationId xmlns:a16="http://schemas.microsoft.com/office/drawing/2014/main" id="{0AF49D93-C78A-F646-92B0-A7932C43D9EE}"/>
+                <a16:creationId xmlns:a16="http://schemas.microsoft.com/office/drawing/2014/main" xmlns="" id="{0AF49D93-C78A-F646-92B0-A7932C43D9EE}"/>
               </a:ext>
             </a:extLst>
           </p:cNvPr>
@@ -3669,7 +3669,7 @@
             <a:fld id="{E1E1CD7C-2161-7D43-862E-CE4C333CD873}" type="slidenum">
               <a:rPr lang="fr-FR" smtClean="0"/>
               <a:pPr/>
-              <a:t>‹#›</a:t>
+              <a:t>‹N°›</a:t>
             </a:fld>
             <a:endParaRPr lang="fr-FR" dirty="0"/>
           </a:p>
@@ -3710,7 +3710,7 @@
           <p:cNvPr id="8" name="Espace réservé pour une image  7">
             <a:extLst>
               <a:ext uri="{FF2B5EF4-FFF2-40B4-BE49-F238E27FC236}">
-                <a16:creationId xmlns:a16="http://schemas.microsoft.com/office/drawing/2014/main" id="{70ED9B2D-C513-AF40-B94F-355C174B8FF0}"/>
+                <a16:creationId xmlns:a16="http://schemas.microsoft.com/office/drawing/2014/main" xmlns="" id="{70ED9B2D-C513-AF40-B94F-355C174B8FF0}"/>
               </a:ext>
             </a:extLst>
           </p:cNvPr>
@@ -3775,7 +3775,7 @@
           <p:cNvPr id="7" name="Espace réservé de la date 6">
             <a:extLst>
               <a:ext uri="{FF2B5EF4-FFF2-40B4-BE49-F238E27FC236}">
-                <a16:creationId xmlns:a16="http://schemas.microsoft.com/office/drawing/2014/main" id="{A02A0D73-096C-844E-97C3-C4A4AF580FDE}"/>
+                <a16:creationId xmlns:a16="http://schemas.microsoft.com/office/drawing/2014/main" xmlns="" id="{A02A0D73-096C-844E-97C3-C4A4AF580FDE}"/>
               </a:ext>
             </a:extLst>
           </p:cNvPr>
@@ -3804,7 +3804,7 @@
           <p:cNvPr id="9" name="Espace réservé du pied de page 8">
             <a:extLst>
               <a:ext uri="{FF2B5EF4-FFF2-40B4-BE49-F238E27FC236}">
-                <a16:creationId xmlns:a16="http://schemas.microsoft.com/office/drawing/2014/main" id="{CEF5AC5C-A2B6-2848-8C47-96A168E211DF}"/>
+                <a16:creationId xmlns:a16="http://schemas.microsoft.com/office/drawing/2014/main" xmlns="" id="{CEF5AC5C-A2B6-2848-8C47-96A168E211DF}"/>
               </a:ext>
             </a:extLst>
           </p:cNvPr>
@@ -3833,7 +3833,7 @@
           <p:cNvPr id="10" name="Espace réservé du numéro de diapositive 9">
             <a:extLst>
               <a:ext uri="{FF2B5EF4-FFF2-40B4-BE49-F238E27FC236}">
-                <a16:creationId xmlns:a16="http://schemas.microsoft.com/office/drawing/2014/main" id="{31B90E33-03D8-2143-B49F-B1474EE1A1F6}"/>
+                <a16:creationId xmlns:a16="http://schemas.microsoft.com/office/drawing/2014/main" xmlns="" id="{31B90E33-03D8-2143-B49F-B1474EE1A1F6}"/>
               </a:ext>
             </a:extLst>
           </p:cNvPr>
@@ -3852,7 +3852,7 @@
             <a:fld id="{E1E1CD7C-2161-7D43-862E-CE4C333CD873}" type="slidenum">
               <a:rPr lang="fr-FR" smtClean="0"/>
               <a:pPr/>
-              <a:t>‹#›</a:t>
+              <a:t>‹N°›</a:t>
             </a:fld>
             <a:endParaRPr lang="fr-FR" dirty="0"/>
           </a:p>
@@ -3863,7 +3863,7 @@
           <p:cNvPr id="11" name="Titre 10">
             <a:extLst>
               <a:ext uri="{FF2B5EF4-FFF2-40B4-BE49-F238E27FC236}">
-                <a16:creationId xmlns:a16="http://schemas.microsoft.com/office/drawing/2014/main" id="{3FC7B5EC-066E-EC4A-B320-77DF64E6E0F0}"/>
+                <a16:creationId xmlns:a16="http://schemas.microsoft.com/office/drawing/2014/main" xmlns="" id="{3FC7B5EC-066E-EC4A-B320-77DF64E6E0F0}"/>
               </a:ext>
             </a:extLst>
           </p:cNvPr>
@@ -3926,7 +3926,7 @@
           <p:cNvPr id="8" name="Espace réservé pour une image  7">
             <a:extLst>
               <a:ext uri="{FF2B5EF4-FFF2-40B4-BE49-F238E27FC236}">
-                <a16:creationId xmlns:a16="http://schemas.microsoft.com/office/drawing/2014/main" id="{70ED9B2D-C513-AF40-B94F-355C174B8FF0}"/>
+                <a16:creationId xmlns:a16="http://schemas.microsoft.com/office/drawing/2014/main" xmlns="" id="{70ED9B2D-C513-AF40-B94F-355C174B8FF0}"/>
               </a:ext>
             </a:extLst>
           </p:cNvPr>
@@ -3991,7 +3991,7 @@
           <p:cNvPr id="7" name="Espace réservé de la date 6">
             <a:extLst>
               <a:ext uri="{FF2B5EF4-FFF2-40B4-BE49-F238E27FC236}">
-                <a16:creationId xmlns:a16="http://schemas.microsoft.com/office/drawing/2014/main" id="{A02A0D73-096C-844E-97C3-C4A4AF580FDE}"/>
+                <a16:creationId xmlns:a16="http://schemas.microsoft.com/office/drawing/2014/main" xmlns="" id="{A02A0D73-096C-844E-97C3-C4A4AF580FDE}"/>
               </a:ext>
             </a:extLst>
           </p:cNvPr>
@@ -4020,7 +4020,7 @@
           <p:cNvPr id="9" name="Espace réservé du pied de page 8">
             <a:extLst>
               <a:ext uri="{FF2B5EF4-FFF2-40B4-BE49-F238E27FC236}">
-                <a16:creationId xmlns:a16="http://schemas.microsoft.com/office/drawing/2014/main" id="{CEF5AC5C-A2B6-2848-8C47-96A168E211DF}"/>
+                <a16:creationId xmlns:a16="http://schemas.microsoft.com/office/drawing/2014/main" xmlns="" id="{CEF5AC5C-A2B6-2848-8C47-96A168E211DF}"/>
               </a:ext>
             </a:extLst>
           </p:cNvPr>
@@ -4049,7 +4049,7 @@
           <p:cNvPr id="10" name="Espace réservé du numéro de diapositive 9">
             <a:extLst>
               <a:ext uri="{FF2B5EF4-FFF2-40B4-BE49-F238E27FC236}">
-                <a16:creationId xmlns:a16="http://schemas.microsoft.com/office/drawing/2014/main" id="{31B90E33-03D8-2143-B49F-B1474EE1A1F6}"/>
+                <a16:creationId xmlns:a16="http://schemas.microsoft.com/office/drawing/2014/main" xmlns="" id="{31B90E33-03D8-2143-B49F-B1474EE1A1F6}"/>
               </a:ext>
             </a:extLst>
           </p:cNvPr>
@@ -4068,7 +4068,7 @@
             <a:fld id="{E1E1CD7C-2161-7D43-862E-CE4C333CD873}" type="slidenum">
               <a:rPr lang="fr-FR" smtClean="0"/>
               <a:pPr/>
-              <a:t>‹#›</a:t>
+              <a:t>‹N°›</a:t>
             </a:fld>
             <a:endParaRPr lang="fr-FR" dirty="0"/>
           </a:p>
@@ -4079,7 +4079,7 @@
           <p:cNvPr id="11" name="Titre 10">
             <a:extLst>
               <a:ext uri="{FF2B5EF4-FFF2-40B4-BE49-F238E27FC236}">
-                <a16:creationId xmlns:a16="http://schemas.microsoft.com/office/drawing/2014/main" id="{3FC7B5EC-066E-EC4A-B320-77DF64E6E0F0}"/>
+                <a16:creationId xmlns:a16="http://schemas.microsoft.com/office/drawing/2014/main" xmlns="" id="{3FC7B5EC-066E-EC4A-B320-77DF64E6E0F0}"/>
               </a:ext>
             </a:extLst>
           </p:cNvPr>
@@ -4142,7 +4142,7 @@
           <p:cNvPr id="8" name="Espace réservé pour une image  7">
             <a:extLst>
               <a:ext uri="{FF2B5EF4-FFF2-40B4-BE49-F238E27FC236}">
-                <a16:creationId xmlns:a16="http://schemas.microsoft.com/office/drawing/2014/main" id="{70ED9B2D-C513-AF40-B94F-355C174B8FF0}"/>
+                <a16:creationId xmlns:a16="http://schemas.microsoft.com/office/drawing/2014/main" xmlns="" id="{70ED9B2D-C513-AF40-B94F-355C174B8FF0}"/>
               </a:ext>
             </a:extLst>
           </p:cNvPr>
@@ -4207,7 +4207,7 @@
           <p:cNvPr id="7" name="Titre 6">
             <a:extLst>
               <a:ext uri="{FF2B5EF4-FFF2-40B4-BE49-F238E27FC236}">
-                <a16:creationId xmlns:a16="http://schemas.microsoft.com/office/drawing/2014/main" id="{C026A30B-6F8E-1445-88F0-A5FB77E124E9}"/>
+                <a16:creationId xmlns:a16="http://schemas.microsoft.com/office/drawing/2014/main" xmlns="" id="{C026A30B-6F8E-1445-88F0-A5FB77E124E9}"/>
               </a:ext>
             </a:extLst>
           </p:cNvPr>
@@ -4235,7 +4235,7 @@
           <p:cNvPr id="9" name="Espace réservé de la date 8">
             <a:extLst>
               <a:ext uri="{FF2B5EF4-FFF2-40B4-BE49-F238E27FC236}">
-                <a16:creationId xmlns:a16="http://schemas.microsoft.com/office/drawing/2014/main" id="{826567D5-4A83-9E48-B441-CCB2A72BA6D1}"/>
+                <a16:creationId xmlns:a16="http://schemas.microsoft.com/office/drawing/2014/main" xmlns="" id="{826567D5-4A83-9E48-B441-CCB2A72BA6D1}"/>
               </a:ext>
             </a:extLst>
           </p:cNvPr>
@@ -4264,7 +4264,7 @@
           <p:cNvPr id="10" name="Espace réservé du pied de page 9">
             <a:extLst>
               <a:ext uri="{FF2B5EF4-FFF2-40B4-BE49-F238E27FC236}">
-                <a16:creationId xmlns:a16="http://schemas.microsoft.com/office/drawing/2014/main" id="{C830A539-93F1-2541-B9F0-330893BD5190}"/>
+                <a16:creationId xmlns:a16="http://schemas.microsoft.com/office/drawing/2014/main" xmlns="" id="{C830A539-93F1-2541-B9F0-330893BD5190}"/>
               </a:ext>
             </a:extLst>
           </p:cNvPr>
@@ -4293,7 +4293,7 @@
           <p:cNvPr id="11" name="Espace réservé du numéro de diapositive 10">
             <a:extLst>
               <a:ext uri="{FF2B5EF4-FFF2-40B4-BE49-F238E27FC236}">
-                <a16:creationId xmlns:a16="http://schemas.microsoft.com/office/drawing/2014/main" id="{82F21D18-8706-7E4D-8FBE-C1E2584541D1}"/>
+                <a16:creationId xmlns:a16="http://schemas.microsoft.com/office/drawing/2014/main" xmlns="" id="{82F21D18-8706-7E4D-8FBE-C1E2584541D1}"/>
               </a:ext>
             </a:extLst>
           </p:cNvPr>
@@ -4312,7 +4312,7 @@
             <a:fld id="{E1E1CD7C-2161-7D43-862E-CE4C333CD873}" type="slidenum">
               <a:rPr lang="fr-FR" smtClean="0"/>
               <a:pPr/>
-              <a:t>‹#›</a:t>
+              <a:t>‹N°›</a:t>
             </a:fld>
             <a:endParaRPr lang="fr-FR" dirty="0"/>
           </a:p>
@@ -4550,7 +4550,7 @@
             <a:fld id="{E1E1CD7C-2161-7D43-862E-CE4C333CD873}" type="slidenum">
               <a:rPr lang="fr-FR" smtClean="0"/>
               <a:pPr/>
-              <a:t>‹#›</a:t>
+              <a:t>‹N°›</a:t>
             </a:fld>
             <a:endParaRPr lang="fr-FR" dirty="0"/>
           </a:p>
@@ -4561,7 +4561,7 @@
           <p:cNvPr id="13" name="Image 12">
             <a:extLst>
               <a:ext uri="{FF2B5EF4-FFF2-40B4-BE49-F238E27FC236}">
-                <a16:creationId xmlns:a16="http://schemas.microsoft.com/office/drawing/2014/main" id="{717E6E68-87EB-C34E-85D5-C26372DFEC99}"/>
+                <a16:creationId xmlns:a16="http://schemas.microsoft.com/office/drawing/2014/main" xmlns="" id="{717E6E68-87EB-C34E-85D5-C26372DFEC99}"/>
               </a:ext>
             </a:extLst>
           </p:cNvPr>
@@ -4591,7 +4591,7 @@
           <p:cNvPr id="14" name="Rectangle 13">
             <a:extLst>
               <a:ext uri="{FF2B5EF4-FFF2-40B4-BE49-F238E27FC236}">
-                <a16:creationId xmlns:a16="http://schemas.microsoft.com/office/drawing/2014/main" id="{75D7A1C0-94CD-D94F-A99F-21847E542637}"/>
+                <a16:creationId xmlns:a16="http://schemas.microsoft.com/office/drawing/2014/main" xmlns="" id="{75D7A1C0-94CD-D94F-A99F-21847E542637}"/>
               </a:ext>
             </a:extLst>
           </p:cNvPr>
@@ -4957,7 +4957,7 @@
   </p:txStyles>
   <p:extLst>
     <p:ext uri="{27BBF7A9-308A-43DC-89C8-2F10F3537804}">
-      <p15:sldGuideLst xmlns:p15="http://schemas.microsoft.com/office/powerpoint/2012/main">
+      <p15:sldGuideLst xmlns:p15="http://schemas.microsoft.com/office/powerpoint/2012/main" xmlns="">
         <p15:guide id="1" orient="horz" pos="1620" userDrawn="1">
           <p15:clr>
             <a:srgbClr val="F26B43"/>
@@ -5111,7 +5111,7 @@
           <p:cNvPr id="3" name="Titre 2">
             <a:extLst>
               <a:ext uri="{FF2B5EF4-FFF2-40B4-BE49-F238E27FC236}">
-                <a16:creationId xmlns:a16="http://schemas.microsoft.com/office/drawing/2014/main" id="{55A5C923-5A79-224D-A6A6-8267C64759A4}"/>
+                <a16:creationId xmlns:a16="http://schemas.microsoft.com/office/drawing/2014/main" xmlns="" id="{55A5C923-5A79-224D-A6A6-8267C64759A4}"/>
               </a:ext>
             </a:extLst>
           </p:cNvPr>
@@ -5152,7 +5152,7 @@
           <p:cNvPr id="4" name="Sous-titre 3">
             <a:extLst>
               <a:ext uri="{FF2B5EF4-FFF2-40B4-BE49-F238E27FC236}">
-                <a16:creationId xmlns:a16="http://schemas.microsoft.com/office/drawing/2014/main" id="{34F3CA74-E434-844A-9C90-0FE7EB8DBFC3}"/>
+                <a16:creationId xmlns:a16="http://schemas.microsoft.com/office/drawing/2014/main" xmlns="" id="{34F3CA74-E434-844A-9C90-0FE7EB8DBFC3}"/>
               </a:ext>
             </a:extLst>
           </p:cNvPr>
@@ -5180,7 +5180,7 @@
           <p:cNvPr id="5" name="Espace réservé du texte 4">
             <a:extLst>
               <a:ext uri="{FF2B5EF4-FFF2-40B4-BE49-F238E27FC236}">
-                <a16:creationId xmlns:a16="http://schemas.microsoft.com/office/drawing/2014/main" id="{BC3BCA55-E2C0-5C4E-89C0-5D85ED2FB439}"/>
+                <a16:creationId xmlns:a16="http://schemas.microsoft.com/office/drawing/2014/main" xmlns="" id="{BC3BCA55-E2C0-5C4E-89C0-5D85ED2FB439}"/>
               </a:ext>
             </a:extLst>
           </p:cNvPr>
@@ -5205,7 +5205,7 @@
           <p:cNvPr id="6" name="Espace réservé du texte 5">
             <a:extLst>
               <a:ext uri="{FF2B5EF4-FFF2-40B4-BE49-F238E27FC236}">
-                <a16:creationId xmlns:a16="http://schemas.microsoft.com/office/drawing/2014/main" id="{18A3154D-FCB0-A34B-BBBC-167C625558EC}"/>
+                <a16:creationId xmlns:a16="http://schemas.microsoft.com/office/drawing/2014/main" xmlns="" id="{18A3154D-FCB0-A34B-BBBC-167C625558EC}"/>
               </a:ext>
             </a:extLst>
           </p:cNvPr>
@@ -5230,7 +5230,7 @@
           <p:cNvPr id="16" name="Picture Placeholder 15" descr="A logo for a company&#10;&#10;AI-generated content may be incorrect.">
             <a:extLst>
               <a:ext uri="{FF2B5EF4-FFF2-40B4-BE49-F238E27FC236}">
-                <a16:creationId xmlns:a16="http://schemas.microsoft.com/office/drawing/2014/main" id="{AB596F6A-8598-4EAC-B989-376AD7830CD4}"/>
+                <a16:creationId xmlns:a16="http://schemas.microsoft.com/office/drawing/2014/main" xmlns="" id="{AB596F6A-8598-4EAC-B989-376AD7830CD4}"/>
               </a:ext>
             </a:extLst>
           </p:cNvPr>
@@ -5288,7 +5288,7 @@
           <p:cNvPr id="2" name="Titre 1">
             <a:extLst>
               <a:ext uri="{FF2B5EF4-FFF2-40B4-BE49-F238E27FC236}">
-                <a16:creationId xmlns:a16="http://schemas.microsoft.com/office/drawing/2014/main" id="{626F21C7-56BC-A74B-BA53-D2D4021D16E5}"/>
+                <a16:creationId xmlns:a16="http://schemas.microsoft.com/office/drawing/2014/main" xmlns="" id="{626F21C7-56BC-A74B-BA53-D2D4021D16E5}"/>
               </a:ext>
             </a:extLst>
           </p:cNvPr>
@@ -5321,7 +5321,7 @@
           <p:cNvPr id="3" name="Espace réservé du texte 2">
             <a:extLst>
               <a:ext uri="{FF2B5EF4-FFF2-40B4-BE49-F238E27FC236}">
-                <a16:creationId xmlns:a16="http://schemas.microsoft.com/office/drawing/2014/main" id="{50E3DCC4-356B-A340-9BF5-39AD9E375463}"/>
+                <a16:creationId xmlns:a16="http://schemas.microsoft.com/office/drawing/2014/main" xmlns="" id="{50E3DCC4-356B-A340-9BF5-39AD9E375463}"/>
               </a:ext>
             </a:extLst>
           </p:cNvPr>
@@ -5423,7 +5423,7 @@
           <p:cNvPr id="14" name="Picture Placeholder 13" descr="A street with cars and buildings&#10;&#10;AI-generated content may be incorrect.">
             <a:extLst>
               <a:ext uri="{FF2B5EF4-FFF2-40B4-BE49-F238E27FC236}">
-                <a16:creationId xmlns:a16="http://schemas.microsoft.com/office/drawing/2014/main" id="{4CF18846-D670-7E4C-4B07-9D4E87838119}"/>
+                <a16:creationId xmlns:a16="http://schemas.microsoft.com/office/drawing/2014/main" xmlns="" id="{4CF18846-D670-7E4C-4B07-9D4E87838119}"/>
               </a:ext>
             </a:extLst>
           </p:cNvPr>
@@ -5448,7 +5448,7 @@
           <p:cNvPr id="5" name="Espace réservé de la date 4">
             <a:extLst>
               <a:ext uri="{FF2B5EF4-FFF2-40B4-BE49-F238E27FC236}">
-                <a16:creationId xmlns:a16="http://schemas.microsoft.com/office/drawing/2014/main" id="{D880124D-0355-C54B-9126-82BC6AB6B368}"/>
+                <a16:creationId xmlns:a16="http://schemas.microsoft.com/office/drawing/2014/main" xmlns="" id="{D880124D-0355-C54B-9126-82BC6AB6B368}"/>
               </a:ext>
             </a:extLst>
           </p:cNvPr>
@@ -5476,7 +5476,7 @@
           <p:cNvPr id="6" name="Espace réservé du pied de page 5">
             <a:extLst>
               <a:ext uri="{FF2B5EF4-FFF2-40B4-BE49-F238E27FC236}">
-                <a16:creationId xmlns:a16="http://schemas.microsoft.com/office/drawing/2014/main" id="{BA9178B4-D530-1544-B47E-4E68F0889249}"/>
+                <a16:creationId xmlns:a16="http://schemas.microsoft.com/office/drawing/2014/main" xmlns="" id="{BA9178B4-D530-1544-B47E-4E68F0889249}"/>
               </a:ext>
             </a:extLst>
           </p:cNvPr>
@@ -5504,7 +5504,7 @@
           <p:cNvPr id="7" name="Espace réservé du numéro de diapositive 6">
             <a:extLst>
               <a:ext uri="{FF2B5EF4-FFF2-40B4-BE49-F238E27FC236}">
-                <a16:creationId xmlns:a16="http://schemas.microsoft.com/office/drawing/2014/main" id="{A8253E77-58BB-5342-B218-CB0FEF98A9E0}"/>
+                <a16:creationId xmlns:a16="http://schemas.microsoft.com/office/drawing/2014/main" xmlns="" id="{A8253E77-58BB-5342-B218-CB0FEF98A9E0}"/>
               </a:ext>
             </a:extLst>
           </p:cNvPr>
@@ -5534,7 +5534,7 @@
           <p:cNvPr id="12" name="Picture 11" descr="A red bird in flight&#10;&#10;AI-generated content may be incorrect.">
             <a:extLst>
               <a:ext uri="{FF2B5EF4-FFF2-40B4-BE49-F238E27FC236}">
-                <a16:creationId xmlns:a16="http://schemas.microsoft.com/office/drawing/2014/main" id="{E3466949-43C3-AD7C-7A8A-F0479A57B6A9}"/>
+                <a16:creationId xmlns:a16="http://schemas.microsoft.com/office/drawing/2014/main" xmlns="" id="{E3466949-43C3-AD7C-7A8A-F0479A57B6A9}"/>
               </a:ext>
             </a:extLst>
           </p:cNvPr>
@@ -5592,7 +5592,7 @@
           <p:cNvPr id="2" name="Espace réservé du contenu 1">
             <a:extLst>
               <a:ext uri="{FF2B5EF4-FFF2-40B4-BE49-F238E27FC236}">
-                <a16:creationId xmlns:a16="http://schemas.microsoft.com/office/drawing/2014/main" id="{3C04D4F0-9F00-D043-B80F-52268AB0057D}"/>
+                <a16:creationId xmlns:a16="http://schemas.microsoft.com/office/drawing/2014/main" xmlns="" id="{3C04D4F0-9F00-D043-B80F-52268AB0057D}"/>
               </a:ext>
             </a:extLst>
           </p:cNvPr>
@@ -5922,8 +5922,59 @@
               <a:t>Python </a:t>
             </a:r>
             <a:r>
+              <a:rPr lang="fr-FR" dirty="0"/>
+              <a:t>F</a:t>
+            </a:r>
+            <a:r>
+              <a:rPr lang="fr-FR" noProof="0" dirty="0" err="1" smtClean="0"/>
+              <a:t>ull</a:t>
+            </a:r>
+            <a:r>
+              <a:rPr lang="fr-FR" noProof="0" dirty="0" smtClean="0"/>
+              <a:t> </a:t>
+            </a:r>
+            <a:r>
+              <a:rPr lang="fr-FR" noProof="0" dirty="0" err="1" smtClean="0"/>
+              <a:t>Stack</a:t>
+            </a:r>
+            <a:r>
+              <a:rPr lang="fr-FR" noProof="0" dirty="0" smtClean="0"/>
+              <a:t> </a:t>
+            </a:r>
+            <a:r>
+              <a:rPr lang="fr-FR" noProof="0" dirty="0" err="1" smtClean="0"/>
+              <a:t>Developer</a:t>
+            </a:r>
+            <a:endParaRPr lang="fr-FR" noProof="0" dirty="0"/>
+          </a:p>
+          <a:p>
+            <a:r>
+              <a:rPr lang="fr-FR" noProof="0" dirty="0"/>
+              <a:t>Spécialiste en analyse statistique spatiale LGB/GEOME EPFL, UEP HUG</a:t>
+            </a:r>
+          </a:p>
+          <a:p>
+            <a:r>
+              <a:rPr lang="fr-FR" noProof="0" dirty="0"/>
+              <a:t>Expertise en Systèmes d’Informations Géographiques (SIG) – enseignement de la partie python pour le cours de SIG (EPFL BA4)</a:t>
+            </a:r>
+          </a:p>
+          <a:p>
+            <a:r>
+              <a:rPr lang="fr-FR" noProof="0" dirty="0"/>
+              <a:t>Software solution </a:t>
+            </a:r>
+            <a:r>
               <a:rPr lang="fr-FR" noProof="0" dirty="0" err="1"/>
-              <a:t>fullstack</a:t>
+              <a:t>engineer</a:t>
+            </a:r>
+            <a:r>
+              <a:rPr lang="fr-FR" noProof="0" dirty="0"/>
+              <a:t> – </a:t>
+            </a:r>
+            <a:r>
+              <a:rPr lang="fr-FR" noProof="0" dirty="0" err="1"/>
+              <a:t>Circet</a:t>
             </a:r>
             <a:r>
               <a:rPr lang="fr-FR" noProof="0" dirty="0"/>
@@ -5931,49 +5982,10 @@
             </a:r>
             <a:r>
               <a:rPr lang="fr-FR" noProof="0" dirty="0" err="1"/>
-              <a:t>devloper</a:t>
+              <a:t>Swiss</a:t>
             </a:r>
             <a:endParaRPr lang="fr-FR" noProof="0" dirty="0"/>
           </a:p>
-          <a:p>
-            <a:r>
-              <a:rPr lang="fr-FR" noProof="0" dirty="0"/>
-              <a:t>Spécialiste en analyse statistique spatiale LGB/GEOME EPFL, UEP HUG</a:t>
-            </a:r>
-          </a:p>
-          <a:p>
-            <a:r>
-              <a:rPr lang="fr-FR" noProof="0" dirty="0"/>
-              <a:t>Expertise en Systèmes d’Informations Géographiques (SIG) – enseignement de la partie python pour le cours de SIG (EPFL BA4)</a:t>
-            </a:r>
-          </a:p>
-          <a:p>
-            <a:r>
-              <a:rPr lang="fr-FR" noProof="0" dirty="0"/>
-              <a:t>Software solution </a:t>
-            </a:r>
-            <a:r>
-              <a:rPr lang="fr-FR" noProof="0" dirty="0" err="1"/>
-              <a:t>engineer</a:t>
-            </a:r>
-            <a:r>
-              <a:rPr lang="fr-FR" noProof="0" dirty="0"/>
-              <a:t> – </a:t>
-            </a:r>
-            <a:r>
-              <a:rPr lang="fr-FR" noProof="0" dirty="0" err="1"/>
-              <a:t>Circet</a:t>
-            </a:r>
-            <a:r>
-              <a:rPr lang="fr-FR" noProof="0" dirty="0"/>
-              <a:t> </a:t>
-            </a:r>
-            <a:r>
-              <a:rPr lang="fr-FR" noProof="0" dirty="0" err="1"/>
-              <a:t>Swiss</a:t>
-            </a:r>
-            <a:endParaRPr lang="fr-FR" noProof="0" dirty="0"/>
-          </a:p>
         </p:txBody>
       </p:sp>
       <p:sp>
@@ -5981,7 +5993,7 @@
           <p:cNvPr id="3" name="Titre 2">
             <a:extLst>
               <a:ext uri="{FF2B5EF4-FFF2-40B4-BE49-F238E27FC236}">
-                <a16:creationId xmlns:a16="http://schemas.microsoft.com/office/drawing/2014/main" id="{0ADC9092-B8AD-9448-9690-13D94442A120}"/>
+                <a16:creationId xmlns:a16="http://schemas.microsoft.com/office/drawing/2014/main" xmlns="" id="{0ADC9092-B8AD-9448-9690-13D94442A120}"/>
               </a:ext>
             </a:extLst>
           </p:cNvPr>
@@ -6028,7 +6040,7 @@
           <p:cNvPr id="4" name="Espace réservé de la date 3">
             <a:extLst>
               <a:ext uri="{FF2B5EF4-FFF2-40B4-BE49-F238E27FC236}">
-                <a16:creationId xmlns:a16="http://schemas.microsoft.com/office/drawing/2014/main" id="{CF0AD287-D36E-824B-97DA-B5B92B429141}"/>
+                <a16:creationId xmlns:a16="http://schemas.microsoft.com/office/drawing/2014/main" xmlns="" id="{CF0AD287-D36E-824B-97DA-B5B92B429141}"/>
               </a:ext>
             </a:extLst>
           </p:cNvPr>
@@ -6056,7 +6068,7 @@
           <p:cNvPr id="5" name="Espace réservé du pied de page 4">
             <a:extLst>
               <a:ext uri="{FF2B5EF4-FFF2-40B4-BE49-F238E27FC236}">
-                <a16:creationId xmlns:a16="http://schemas.microsoft.com/office/drawing/2014/main" id="{EDD9CD81-F741-E34D-918B-879020443A81}"/>
+                <a16:creationId xmlns:a16="http://schemas.microsoft.com/office/drawing/2014/main" xmlns="" id="{EDD9CD81-F741-E34D-918B-879020443A81}"/>
               </a:ext>
             </a:extLst>
           </p:cNvPr>
@@ -6084,7 +6096,7 @@
           <p:cNvPr id="6" name="Espace réservé du numéro de diapositive 5">
             <a:extLst>
               <a:ext uri="{FF2B5EF4-FFF2-40B4-BE49-F238E27FC236}">
-                <a16:creationId xmlns:a16="http://schemas.microsoft.com/office/drawing/2014/main" id="{F5C95DC5-778C-474A-AD7D-E5E2435C9631}"/>
+                <a16:creationId xmlns:a16="http://schemas.microsoft.com/office/drawing/2014/main" xmlns="" id="{F5C95DC5-778C-474A-AD7D-E5E2435C9631}"/>
               </a:ext>
             </a:extLst>
           </p:cNvPr>
@@ -6114,7 +6126,7 @@
           <p:cNvPr id="9" name="Picture 8" descr="A red bird in flight&#10;&#10;AI-generated content may be incorrect.">
             <a:extLst>
               <a:ext uri="{FF2B5EF4-FFF2-40B4-BE49-F238E27FC236}">
-                <a16:creationId xmlns:a16="http://schemas.microsoft.com/office/drawing/2014/main" id="{DEDB9D24-BB8F-9554-6A1F-C4A4816D6287}"/>
+                <a16:creationId xmlns:a16="http://schemas.microsoft.com/office/drawing/2014/main" xmlns="" id="{DEDB9D24-BB8F-9554-6A1F-C4A4816D6287}"/>
               </a:ext>
             </a:extLst>
           </p:cNvPr>
@@ -6158,7 +6170,7 @@
         <p:cNvPr id="1" name="">
           <a:extLst>
             <a:ext uri="{FF2B5EF4-FFF2-40B4-BE49-F238E27FC236}">
-              <a16:creationId xmlns:a16="http://schemas.microsoft.com/office/drawing/2014/main" id="{05167662-E3A0-555F-6128-ED02C95C5F2B}"/>
+              <a16:creationId xmlns:a16="http://schemas.microsoft.com/office/drawing/2014/main" xmlns="" id="{05167662-E3A0-555F-6128-ED02C95C5F2B}"/>
             </a:ext>
           </a:extLst>
         </p:cNvPr>
@@ -6178,7 +6190,7 @@
           <p:cNvPr id="2" name="Espace réservé du contenu 1">
             <a:extLst>
               <a:ext uri="{FF2B5EF4-FFF2-40B4-BE49-F238E27FC236}">
-                <a16:creationId xmlns:a16="http://schemas.microsoft.com/office/drawing/2014/main" id="{26A6FBEE-FF1F-6FDA-D6F3-8E5BF21AC251}"/>
+                <a16:creationId xmlns:a16="http://schemas.microsoft.com/office/drawing/2014/main" xmlns="" id="{26A6FBEE-FF1F-6FDA-D6F3-8E5BF21AC251}"/>
               </a:ext>
             </a:extLst>
           </p:cNvPr>
@@ -6201,12 +6213,16 @@
               <a:t>Web </a:t>
             </a:r>
             <a:r>
-              <a:rPr lang="fr-FR" noProof="0" dirty="0" err="1"/>
-              <a:t>devloper</a:t>
+              <a:rPr lang="fr-FR" noProof="0" dirty="0" err="1" smtClean="0"/>
+              <a:t>developer</a:t>
+            </a:r>
+            <a:r>
+              <a:rPr lang="fr-FR" noProof="0" dirty="0" smtClean="0"/>
+              <a:t> </a:t>
             </a:r>
             <a:r>
               <a:rPr lang="fr-FR" noProof="0" dirty="0"/>
-              <a:t> – TRSC (Transnational </a:t>
+              <a:t>– TRSC (Transnational </a:t>
             </a:r>
             <a:r>
               <a:rPr lang="fr-FR" dirty="0"/>
@@ -6302,7 +6318,7 @@
           <p:cNvPr id="3" name="Titre 2">
             <a:extLst>
               <a:ext uri="{FF2B5EF4-FFF2-40B4-BE49-F238E27FC236}">
-                <a16:creationId xmlns:a16="http://schemas.microsoft.com/office/drawing/2014/main" id="{3C918719-CF67-1F4E-F4A6-FC534A0CE387}"/>
+                <a16:creationId xmlns:a16="http://schemas.microsoft.com/office/drawing/2014/main" xmlns="" id="{3C918719-CF67-1F4E-F4A6-FC534A0CE387}"/>
               </a:ext>
             </a:extLst>
           </p:cNvPr>
@@ -6349,7 +6365,7 @@
           <p:cNvPr id="4" name="Espace réservé de la date 3">
             <a:extLst>
               <a:ext uri="{FF2B5EF4-FFF2-40B4-BE49-F238E27FC236}">
-                <a16:creationId xmlns:a16="http://schemas.microsoft.com/office/drawing/2014/main" id="{6C07AC6C-71B6-AAF4-45EB-C0B932CA4FDD}"/>
+                <a16:creationId xmlns:a16="http://schemas.microsoft.com/office/drawing/2014/main" xmlns="" id="{6C07AC6C-71B6-AAF4-45EB-C0B932CA4FDD}"/>
               </a:ext>
             </a:extLst>
           </p:cNvPr>
@@ -6377,7 +6393,7 @@
           <p:cNvPr id="5" name="Espace réservé du pied de page 4">
             <a:extLst>
               <a:ext uri="{FF2B5EF4-FFF2-40B4-BE49-F238E27FC236}">
-                <a16:creationId xmlns:a16="http://schemas.microsoft.com/office/drawing/2014/main" id="{2774A5BE-E9B2-E7E6-FC01-6E38FD119B7C}"/>
+                <a16:creationId xmlns:a16="http://schemas.microsoft.com/office/drawing/2014/main" xmlns="" id="{2774A5BE-E9B2-E7E6-FC01-6E38FD119B7C}"/>
               </a:ext>
             </a:extLst>
           </p:cNvPr>
@@ -6405,7 +6421,7 @@
           <p:cNvPr id="6" name="Espace réservé du numéro de diapositive 5">
             <a:extLst>
               <a:ext uri="{FF2B5EF4-FFF2-40B4-BE49-F238E27FC236}">
-                <a16:creationId xmlns:a16="http://schemas.microsoft.com/office/drawing/2014/main" id="{FA11CF96-73F7-D9DB-9BCB-69F7860C60B1}"/>
+                <a16:creationId xmlns:a16="http://schemas.microsoft.com/office/drawing/2014/main" xmlns="" id="{FA11CF96-73F7-D9DB-9BCB-69F7860C60B1}"/>
               </a:ext>
             </a:extLst>
           </p:cNvPr>
@@ -6435,7 +6451,7 @@
           <p:cNvPr id="9" name="Picture 8" descr="A red bird in flight&#10;&#10;AI-generated content may be incorrect.">
             <a:extLst>
               <a:ext uri="{FF2B5EF4-FFF2-40B4-BE49-F238E27FC236}">
-                <a16:creationId xmlns:a16="http://schemas.microsoft.com/office/drawing/2014/main" id="{869F92DA-A721-FEBA-C024-8FAB417A22BA}"/>
+                <a16:creationId xmlns:a16="http://schemas.microsoft.com/office/drawing/2014/main" xmlns="" id="{869F92DA-A721-FEBA-C024-8FAB417A22BA}"/>
               </a:ext>
             </a:extLst>
           </p:cNvPr>
@@ -6666,7 +6682,7 @@
   <a:extraClrSchemeLst/>
   <a:extLst>
     <a:ext uri="{05A4C25C-085E-4340-85A3-A5531E510DB2}">
-      <thm15:themeFamily xmlns:thm15="http://schemas.microsoft.com/office/thememl/2012/main" name="Template_EPFL_Beta2" id="{6A525B41-3E68-491F-A6C9-0B15EA1321FE}" vid="{993E2952-EB5D-4425-8012-1B04381EBC4A}"/>
+      <thm15:themeFamily xmlns:thm15="http://schemas.microsoft.com/office/thememl/2012/main" xmlns="" name="Template_EPFL_Beta2" id="{6A525B41-3E68-491F-A6C9-0B15EA1321FE}" vid="{993E2952-EB5D-4425-8012-1B04381EBC4A}"/>
     </a:ext>
   </a:extLst>
 </a:theme>
@@ -6961,7 +6977,7 @@
   <a:extraClrSchemeLst/>
   <a:extLst>
     <a:ext uri="{05A4C25C-085E-4340-85A3-A5531E510DB2}">
-      <thm15:themeFamily xmlns:thm15="http://schemas.microsoft.com/office/thememl/2012/main" name="Office Theme" id="{62F939B6-93AF-4DB8-9C6B-D6C7DFDC589F}" vid="{4A3C46E8-61CC-4603-A589-7422A47A8E4A}"/>
+      <thm15:themeFamily xmlns:thm15="http://schemas.microsoft.com/office/thememl/2012/main" xmlns="" name="Office Theme" id="{62F939B6-93AF-4DB8-9C6B-D6C7DFDC589F}" vid="{4A3C46E8-61CC-4603-A589-7422A47A8E4A}"/>
     </a:ext>
   </a:extLst>
 </a:theme>
@@ -7222,28 +7238,13 @@
   <a:extraClrSchemeLst/>
   <a:extLst>
     <a:ext uri="{05A4C25C-085E-4340-85A3-A5531E510DB2}">
-      <thm15:themeFamily xmlns:thm15="http://schemas.microsoft.com/office/thememl/2012/main" name="Office Theme" id="{62F939B6-93AF-4DB8-9C6B-D6C7DFDC589F}" vid="{4A3C46E8-61CC-4603-A589-7422A47A8E4A}"/>
+      <thm15:themeFamily xmlns:thm15="http://schemas.microsoft.com/office/thememl/2012/main" xmlns="" name="Office Theme" id="{62F939B6-93AF-4DB8-9C6B-D6C7DFDC589F}" vid="{4A3C46E8-61CC-4603-A589-7422A47A8E4A}"/>
     </a:ext>
   </a:extLst>
 </a:theme>
 </file>
 
 <file path=customXml/item1.xml><?xml version="1.0" encoding="utf-8"?>
-<?mso-contentType ?>
-<FormTemplates xmlns="http://schemas.microsoft.com/sharepoint/v3/contenttype/forms">
-  <Display>DocumentLibraryForm</Display>
-  <Edit>DocumentLibraryForm</Edit>
-  <New>DocumentLibraryForm</New>
-</FormTemplates>
-</file>
-
-<file path=customXml/item2.xml><?xml version="1.0" encoding="utf-8"?>
-<p:properties xmlns:p="http://schemas.microsoft.com/office/2006/metadata/properties" xmlns:xsi="http://www.w3.org/2001/XMLSchema-instance" xmlns:pc="http://schemas.microsoft.com/office/infopath/2007/PartnerControls">
-  <documentManagement/>
-</p:properties>
-</file>
-
-<file path=customXml/item3.xml><?xml version="1.0" encoding="utf-8"?>
 <ct:contentTypeSchema xmlns:ct="http://schemas.microsoft.com/office/2006/metadata/contentType" xmlns:ma="http://schemas.microsoft.com/office/2006/metadata/properties/metaAttributes" ct:_="" ma:_="" ma:contentTypeName="Document" ma:contentTypeID="0x0101001BFC127AB4946248A5685C1F92D54FFE" ma:contentTypeVersion="0" ma:contentTypeDescription="Crée un document." ma:contentTypeScope="" ma:versionID="ef3ff242486930b75c69099c0dd02c57">
   <xsd:schema xmlns:xsd="http://www.w3.org/2001/XMLSchema" xmlns:xs="http://www.w3.org/2001/XMLSchema" xmlns:p="http://schemas.microsoft.com/office/2006/metadata/properties" targetNamespace="http://schemas.microsoft.com/office/2006/metadata/properties" ma:root="true" ma:fieldsID="ab09c1ba23edfaa45a5e9d385267c9b5">
     <xsd:element name="properties">
@@ -7357,10 +7358,33 @@
 </ct:contentTypeSchema>
 </file>
 
+<file path=customXml/item2.xml><?xml version="1.0" encoding="utf-8"?>
+<p:properties xmlns:p="http://schemas.microsoft.com/office/2006/metadata/properties" xmlns:xsi="http://www.w3.org/2001/XMLSchema-instance" xmlns:pc="http://schemas.microsoft.com/office/infopath/2007/PartnerControls">
+  <documentManagement/>
+</p:properties>
+</file>
+
+<file path=customXml/item3.xml><?xml version="1.0" encoding="utf-8"?>
+<?mso-contentType ?>
+<FormTemplates xmlns="http://schemas.microsoft.com/sharepoint/v3/contenttype/forms">
+  <Display>DocumentLibraryForm</Display>
+  <Edit>DocumentLibraryForm</Edit>
+  <New>DocumentLibraryForm</New>
+</FormTemplates>
+</file>
+
 <file path=customXml/itemProps1.xml><?xml version="1.0" encoding="utf-8"?>
-<ds:datastoreItem xmlns:ds="http://schemas.openxmlformats.org/officeDocument/2006/customXml" ds:itemID="{266205E9-12FC-4D6C-B0C7-1E9025EEB158}">
+<ds:datastoreItem xmlns:ds="http://schemas.openxmlformats.org/officeDocument/2006/customXml" ds:itemID="{8F8CE09B-89B1-4B5D-BED2-87C84F077711}">
   <ds:schemaRefs>
-    <ds:schemaRef ds:uri="http://schemas.microsoft.com/sharepoint/v3/contenttype/forms"/>
+    <ds:schemaRef ds:uri="http://schemas.microsoft.com/office/2006/metadata/contentType"/>
+    <ds:schemaRef ds:uri="http://schemas.microsoft.com/office/2006/metadata/properties/metaAttributes"/>
+    <ds:schemaRef ds:uri="http://www.w3.org/2001/XMLSchema"/>
+    <ds:schemaRef ds:uri="http://schemas.microsoft.com/office/2006/metadata/properties"/>
+    <ds:schemaRef ds:uri="http://schemas.openxmlformats.org/package/2006/metadata/core-properties"/>
+    <ds:schemaRef ds:uri="http://purl.org/dc/elements/1.1/"/>
+    <ds:schemaRef ds:uri="http://purl.org/dc/terms/"/>
+    <ds:schemaRef ds:uri="http://schemas.microsoft.com/internal/obd"/>
+    <ds:schemaRef ds:uri="http://schemas.microsoft.com/office/infopath/2007/PartnerControls"/>
   </ds:schemaRefs>
 </ds:datastoreItem>
 </file>
@@ -7375,17 +7399,9 @@
 </file>
 
 <file path=customXml/itemProps3.xml><?xml version="1.0" encoding="utf-8"?>
-<ds:datastoreItem xmlns:ds="http://schemas.openxmlformats.org/officeDocument/2006/customXml" ds:itemID="{8F8CE09B-89B1-4B5D-BED2-87C84F077711}">
+<ds:datastoreItem xmlns:ds="http://schemas.openxmlformats.org/officeDocument/2006/customXml" ds:itemID="{266205E9-12FC-4D6C-B0C7-1E9025EEB158}">
   <ds:schemaRefs>
-    <ds:schemaRef ds:uri="http://schemas.microsoft.com/office/2006/metadata/contentType"/>
-    <ds:schemaRef ds:uri="http://schemas.microsoft.com/office/2006/metadata/properties/metaAttributes"/>
-    <ds:schemaRef ds:uri="http://www.w3.org/2001/XMLSchema"/>
-    <ds:schemaRef ds:uri="http://schemas.microsoft.com/office/2006/metadata/properties"/>
-    <ds:schemaRef ds:uri="http://schemas.openxmlformats.org/package/2006/metadata/core-properties"/>
-    <ds:schemaRef ds:uri="http://purl.org/dc/elements/1.1/"/>
-    <ds:schemaRef ds:uri="http://purl.org/dc/terms/"/>
-    <ds:schemaRef ds:uri="http://schemas.microsoft.com/internal/obd"/>
-    <ds:schemaRef ds:uri="http://schemas.microsoft.com/office/infopath/2007/PartnerControls"/>
+    <ds:schemaRef ds:uri="http://schemas.microsoft.com/sharepoint/v3/contenttype/forms"/>
   </ds:schemaRefs>
 </ds:datastoreItem>
 </file>
</xml_diff>